<commit_message>
changed per school summary images
</commit_message>
<xml_diff>
--- a/Resources/combined_summaries.pptx
+++ b/Resources/combined_summaries.pptx
@@ -7,7 +7,7 @@
   <p:sldIdLst>
     <p:sldId id="256" r:id="rId2"/>
     <p:sldId id="257" r:id="rId3"/>
-    <p:sldId id="260" r:id="rId4"/>
+    <p:sldId id="263" r:id="rId4"/>
     <p:sldId id="258" r:id="rId5"/>
     <p:sldId id="259" r:id="rId6"/>
     <p:sldId id="261" r:id="rId7"/>
@@ -110,6 +110,11 @@
       </a:defRPr>
     </a:lvl9pPr>
   </p:defaultTextStyle>
+  <p:extLst>
+    <p:ext uri="{EFAFB233-063F-42B5-8137-9DF3F51BA10A}">
+      <p15:sldGuideLst xmlns:p15="http://schemas.microsoft.com/office/powerpoint/2012/main"/>
+    </p:ext>
+  </p:extLst>
 </p:presentation>
 </file>
 
@@ -3555,10 +3560,10 @@
       </p:grpSpPr>
       <p:grpSp>
         <p:nvGrpSpPr>
-          <p:cNvPr id="19" name="Group 18">
+          <p:cNvPr id="16" name="Group 15">
             <a:extLst>
               <a:ext uri="{FF2B5EF4-FFF2-40B4-BE49-F238E27FC236}">
-                <a16:creationId xmlns:a16="http://schemas.microsoft.com/office/drawing/2014/main" id="{9A4F66C1-56B7-429C-8E11-500D45EF7D6E}"/>
+                <a16:creationId xmlns:a16="http://schemas.microsoft.com/office/drawing/2014/main" id="{7768A533-46B9-48F5-9CF1-E82F85A92F5B}"/>
               </a:ext>
             </a:extLst>
           </p:cNvPr>
@@ -3567,10 +3572,10 @@
         </p:nvGrpSpPr>
         <p:grpSpPr>
           <a:xfrm>
-            <a:off x="436787" y="335459"/>
-            <a:ext cx="11318426" cy="4914851"/>
-            <a:chOff x="485862" y="15419"/>
-            <a:chExt cx="11318426" cy="4914851"/>
+            <a:off x="0" y="335459"/>
+            <a:ext cx="12192000" cy="5714433"/>
+            <a:chOff x="0" y="335459"/>
+            <a:chExt cx="12192000" cy="5714433"/>
           </a:xfrm>
         </p:grpSpPr>
         <p:sp>
@@ -3587,7 +3592,7 @@
           </p:nvSpPr>
           <p:spPr>
             <a:xfrm>
-              <a:off x="4269397" y="15419"/>
+              <a:off x="4220322" y="335459"/>
               <a:ext cx="3653203" cy="584775"/>
             </a:xfrm>
             <a:prstGeom prst="rect">
@@ -3622,7 +3627,7 @@
           </p:nvSpPr>
           <p:spPr>
             <a:xfrm>
-              <a:off x="2617265" y="905887"/>
+              <a:off x="2252307" y="1225926"/>
               <a:ext cx="1538631" cy="307777"/>
             </a:xfrm>
             <a:prstGeom prst="rect">
@@ -3643,130 +3648,6 @@
             </a:p>
           </p:txBody>
         </p:sp>
-        <p:pic>
-          <p:nvPicPr>
-            <p:cNvPr id="5" name="Picture 4" descr="Table&#10;&#10;Description automatically generated">
-              <a:extLst>
-                <a:ext uri="{FF2B5EF4-FFF2-40B4-BE49-F238E27FC236}">
-                  <a16:creationId xmlns:a16="http://schemas.microsoft.com/office/drawing/2014/main" id="{35D62ACE-ECD1-48F7-B78F-BF64AD11BAC9}"/>
-                </a:ext>
-              </a:extLst>
-            </p:cNvPr>
-            <p:cNvPicPr>
-              <a:picLocks noChangeAspect="1"/>
-            </p:cNvPicPr>
-            <p:nvPr/>
-          </p:nvPicPr>
-          <p:blipFill>
-            <a:blip r:embed="rId2">
-              <a:extLst>
-                <a:ext uri="{28A0092B-C50C-407E-A947-70E740481C1C}">
-                  <a14:useLocalDpi xmlns:a14="http://schemas.microsoft.com/office/drawing/2010/main" val="0"/>
-                </a:ext>
-              </a:extLst>
-            </a:blip>
-            <a:stretch>
-              <a:fillRect/>
-            </a:stretch>
-          </p:blipFill>
-          <p:spPr>
-            <a:xfrm>
-              <a:off x="485862" y="1449407"/>
-              <a:ext cx="5801438" cy="3480863"/>
-            </a:xfrm>
-            <a:prstGeom prst="rect">
-              <a:avLst/>
-            </a:prstGeom>
-          </p:spPr>
-        </p:pic>
-        <p:pic>
-          <p:nvPicPr>
-            <p:cNvPr id="7" name="Picture 6" descr="Table&#10;&#10;Description automatically generated">
-              <a:extLst>
-                <a:ext uri="{FF2B5EF4-FFF2-40B4-BE49-F238E27FC236}">
-                  <a16:creationId xmlns:a16="http://schemas.microsoft.com/office/drawing/2014/main" id="{E9F25CB1-9F8F-4836-A3E2-48381E36F7E1}"/>
-                </a:ext>
-              </a:extLst>
-            </p:cNvPr>
-            <p:cNvPicPr>
-              <a:picLocks noChangeAspect="1"/>
-            </p:cNvPicPr>
-            <p:nvPr/>
-          </p:nvPicPr>
-          <p:blipFill>
-            <a:blip r:embed="rId3">
-              <a:extLst>
-                <a:ext uri="{28A0092B-C50C-407E-A947-70E740481C1C}">
-                  <a14:useLocalDpi xmlns:a14="http://schemas.microsoft.com/office/drawing/2010/main" val="0"/>
-                </a:ext>
-              </a:extLst>
-            </a:blip>
-            <a:stretch>
-              <a:fillRect/>
-            </a:stretch>
-          </p:blipFill>
-          <p:spPr>
-            <a:xfrm>
-              <a:off x="6300875" y="1477844"/>
-              <a:ext cx="5405262" cy="3439711"/>
-            </a:xfrm>
-            <a:prstGeom prst="rect">
-              <a:avLst/>
-            </a:prstGeom>
-          </p:spPr>
-        </p:pic>
-        <p:sp>
-          <p:nvSpPr>
-            <p:cNvPr id="11" name="Rectangle 10">
-              <a:extLst>
-                <a:ext uri="{FF2B5EF4-FFF2-40B4-BE49-F238E27FC236}">
-                  <a16:creationId xmlns:a16="http://schemas.microsoft.com/office/drawing/2014/main" id="{F5C991DF-5EAF-4382-9D87-856E04A4757C}"/>
-                </a:ext>
-              </a:extLst>
-            </p:cNvPr>
-            <p:cNvSpPr/>
-            <p:nvPr/>
-          </p:nvSpPr>
-          <p:spPr>
-            <a:xfrm>
-              <a:off x="485862" y="4208730"/>
-              <a:ext cx="11220275" cy="230909"/>
-            </a:xfrm>
-            <a:prstGeom prst="rect">
-              <a:avLst/>
-            </a:prstGeom>
-            <a:noFill/>
-            <a:ln w="28575">
-              <a:solidFill>
-                <a:srgbClr val="FF0000"/>
-              </a:solidFill>
-            </a:ln>
-          </p:spPr>
-          <p:style>
-            <a:lnRef idx="2">
-              <a:schemeClr val="accent1">
-                <a:shade val="50000"/>
-              </a:schemeClr>
-            </a:lnRef>
-            <a:fillRef idx="1">
-              <a:schemeClr val="accent1"/>
-            </a:fillRef>
-            <a:effectRef idx="0">
-              <a:schemeClr val="accent1"/>
-            </a:effectRef>
-            <a:fontRef idx="minor">
-              <a:schemeClr val="lt1"/>
-            </a:fontRef>
-          </p:style>
-          <p:txBody>
-            <a:bodyPr rtlCol="0" anchor="ctr"/>
-            <a:lstStyle/>
-            <a:p>
-              <a:pPr algn="ctr"/>
-              <a:endParaRPr lang="en-US"/>
-            </a:p>
-          </p:txBody>
-        </p:sp>
         <p:sp>
           <p:nvSpPr>
             <p:cNvPr id="18" name="TextBox 17">
@@ -3781,7 +3662,7 @@
           </p:nvSpPr>
           <p:spPr>
             <a:xfrm>
-              <a:off x="6202723" y="798165"/>
+              <a:off x="6337781" y="1118204"/>
               <a:ext cx="5601565" cy="523220"/>
             </a:xfrm>
             <a:prstGeom prst="rect">
@@ -3835,46 +3716,238 @@
             </a:p>
           </p:txBody>
         </p:sp>
+        <p:pic>
+          <p:nvPicPr>
+            <p:cNvPr id="3" name="Picture 2" descr="Table&#10;&#10;Description automatically generated">
+              <a:extLst>
+                <a:ext uri="{FF2B5EF4-FFF2-40B4-BE49-F238E27FC236}">
+                  <a16:creationId xmlns:a16="http://schemas.microsoft.com/office/drawing/2014/main" id="{993F3345-8CC6-452D-911B-EF1DA8D5060E}"/>
+                </a:ext>
+              </a:extLst>
+            </p:cNvPr>
+            <p:cNvPicPr>
+              <a:picLocks noChangeAspect="1"/>
+            </p:cNvPicPr>
+            <p:nvPr/>
+          </p:nvPicPr>
+          <p:blipFill rotWithShape="1">
+            <a:blip r:embed="rId2">
+              <a:extLst>
+                <a:ext uri="{28A0092B-C50C-407E-A947-70E740481C1C}">
+                  <a14:useLocalDpi xmlns:a14="http://schemas.microsoft.com/office/drawing/2010/main" val="0"/>
+                </a:ext>
+              </a:extLst>
+            </a:blip>
+            <a:srcRect l="1192"/>
+            <a:stretch/>
+          </p:blipFill>
+          <p:spPr>
+            <a:xfrm>
+              <a:off x="0" y="2082642"/>
+              <a:ext cx="6043247" cy="3967250"/>
+            </a:xfrm>
+            <a:prstGeom prst="rect">
+              <a:avLst/>
+            </a:prstGeom>
+          </p:spPr>
+        </p:pic>
+        <p:pic>
+          <p:nvPicPr>
+            <p:cNvPr id="12" name="Picture 11" descr="Table&#10;&#10;Description automatically generated">
+              <a:extLst>
+                <a:ext uri="{FF2B5EF4-FFF2-40B4-BE49-F238E27FC236}">
+                  <a16:creationId xmlns:a16="http://schemas.microsoft.com/office/drawing/2014/main" id="{9ABB149B-7B45-4221-A0E9-1C7258F905CE}"/>
+                </a:ext>
+              </a:extLst>
+            </p:cNvPr>
+            <p:cNvPicPr>
+              <a:picLocks noChangeAspect="1"/>
+            </p:cNvPicPr>
+            <p:nvPr/>
+          </p:nvPicPr>
+          <p:blipFill rotWithShape="1">
+            <a:blip r:embed="rId3">
+              <a:extLst>
+                <a:ext uri="{28A0092B-C50C-407E-A947-70E740481C1C}">
+                  <a14:useLocalDpi xmlns:a14="http://schemas.microsoft.com/office/drawing/2010/main" val="0"/>
+                </a:ext>
+              </a:extLst>
+            </a:blip>
+            <a:srcRect r="1699"/>
+            <a:stretch/>
+          </p:blipFill>
+          <p:spPr>
+            <a:xfrm>
+              <a:off x="6085129" y="2082642"/>
+              <a:ext cx="6106871" cy="3967250"/>
+            </a:xfrm>
+            <a:prstGeom prst="rect">
+              <a:avLst/>
+            </a:prstGeom>
+          </p:spPr>
+        </p:pic>
+        <p:cxnSp>
+          <p:nvCxnSpPr>
+            <p:cNvPr id="20" name="Straight Connector 19">
+              <a:extLst>
+                <a:ext uri="{FF2B5EF4-FFF2-40B4-BE49-F238E27FC236}">
+                  <a16:creationId xmlns:a16="http://schemas.microsoft.com/office/drawing/2014/main" id="{ECA1DE89-BAD5-49FB-9E2D-DA692CCDDA52}"/>
+                </a:ext>
+              </a:extLst>
+            </p:cNvPr>
+            <p:cNvCxnSpPr>
+              <a:cxnSpLocks/>
+            </p:cNvCxnSpPr>
+            <p:nvPr/>
+          </p:nvCxnSpPr>
+          <p:spPr>
+            <a:xfrm flipH="1">
+              <a:off x="6058495" y="1118374"/>
+              <a:ext cx="15900" cy="4838543"/>
+            </a:xfrm>
+            <a:prstGeom prst="line">
+              <a:avLst/>
+            </a:prstGeom>
+            <a:ln w="28575"/>
+          </p:spPr>
+          <p:style>
+            <a:lnRef idx="1">
+              <a:schemeClr val="dk1"/>
+            </a:lnRef>
+            <a:fillRef idx="0">
+              <a:schemeClr val="dk1"/>
+            </a:fillRef>
+            <a:effectRef idx="0">
+              <a:schemeClr val="dk1"/>
+            </a:effectRef>
+            <a:fontRef idx="minor">
+              <a:schemeClr val="tx1"/>
+            </a:fontRef>
+          </p:style>
+        </p:cxnSp>
+        <p:sp>
+          <p:nvSpPr>
+            <p:cNvPr id="21" name="Rectangle 20">
+              <a:extLst>
+                <a:ext uri="{FF2B5EF4-FFF2-40B4-BE49-F238E27FC236}">
+                  <a16:creationId xmlns:a16="http://schemas.microsoft.com/office/drawing/2014/main" id="{C43E6948-1B25-4E1D-8801-7F4B9906213C}"/>
+                </a:ext>
+              </a:extLst>
+            </p:cNvPr>
+            <p:cNvSpPr/>
+            <p:nvPr/>
+          </p:nvSpPr>
+          <p:spPr>
+            <a:xfrm>
+              <a:off x="0" y="2599598"/>
+              <a:ext cx="12192000" cy="267888"/>
+            </a:xfrm>
+            <a:prstGeom prst="rect">
+              <a:avLst/>
+            </a:prstGeom>
+            <a:noFill/>
+            <a:ln w="28575">
+              <a:solidFill>
+                <a:srgbClr val="FF0000"/>
+              </a:solidFill>
+            </a:ln>
+          </p:spPr>
+          <p:style>
+            <a:lnRef idx="2">
+              <a:schemeClr val="accent1">
+                <a:shade val="50000"/>
+              </a:schemeClr>
+            </a:lnRef>
+            <a:fillRef idx="1">
+              <a:schemeClr val="accent1"/>
+            </a:fillRef>
+            <a:effectRef idx="0">
+              <a:schemeClr val="accent1"/>
+            </a:effectRef>
+            <a:fontRef idx="minor">
+              <a:schemeClr val="lt1"/>
+            </a:fontRef>
+          </p:style>
+          <p:txBody>
+            <a:bodyPr rtlCol="0" anchor="ctr"/>
+            <a:lstStyle/>
+            <a:p>
+              <a:pPr algn="ctr"/>
+              <a:endParaRPr lang="en-US"/>
+            </a:p>
+          </p:txBody>
+        </p:sp>
+        <p:sp>
+          <p:nvSpPr>
+            <p:cNvPr id="23" name="TextBox 22">
+              <a:extLst>
+                <a:ext uri="{FF2B5EF4-FFF2-40B4-BE49-F238E27FC236}">
+                  <a16:creationId xmlns:a16="http://schemas.microsoft.com/office/drawing/2014/main" id="{1E7E4FA1-B67A-4875-8241-878B0F3C5883}"/>
+                </a:ext>
+              </a:extLst>
+            </p:cNvPr>
+            <p:cNvSpPr txBox="1"/>
+            <p:nvPr/>
+          </p:nvSpPr>
+          <p:spPr>
+            <a:xfrm>
+              <a:off x="7745986" y="1821032"/>
+              <a:ext cx="2785153" cy="261610"/>
+            </a:xfrm>
+            <a:prstGeom prst="rect">
+              <a:avLst/>
+            </a:prstGeom>
+            <a:noFill/>
+          </p:spPr>
+          <p:txBody>
+            <a:bodyPr wrap="square" rtlCol="0">
+              <a:spAutoFit/>
+            </a:bodyPr>
+            <a:lstStyle/>
+            <a:p>
+              <a:r>
+                <a:rPr lang="en-US" sz="1100" dirty="0"/>
+                <a:t>Schools ranked by overall passing percentage</a:t>
+              </a:r>
+            </a:p>
+          </p:txBody>
+        </p:sp>
+        <p:sp>
+          <p:nvSpPr>
+            <p:cNvPr id="24" name="TextBox 23">
+              <a:extLst>
+                <a:ext uri="{FF2B5EF4-FFF2-40B4-BE49-F238E27FC236}">
+                  <a16:creationId xmlns:a16="http://schemas.microsoft.com/office/drawing/2014/main" id="{D480DD0A-2DAB-4B01-9BBE-90AA6972BE4E}"/>
+                </a:ext>
+              </a:extLst>
+            </p:cNvPr>
+            <p:cNvSpPr txBox="1"/>
+            <p:nvPr/>
+          </p:nvSpPr>
+          <p:spPr>
+            <a:xfrm>
+              <a:off x="1629045" y="1821032"/>
+              <a:ext cx="2785153" cy="261610"/>
+            </a:xfrm>
+            <a:prstGeom prst="rect">
+              <a:avLst/>
+            </a:prstGeom>
+            <a:noFill/>
+          </p:spPr>
+          <p:txBody>
+            <a:bodyPr wrap="square" rtlCol="0">
+              <a:spAutoFit/>
+            </a:bodyPr>
+            <a:lstStyle/>
+            <a:p>
+              <a:r>
+                <a:rPr lang="en-US" sz="1100" dirty="0"/>
+                <a:t>Schools ranked by overall passing percentage</a:t>
+              </a:r>
+            </a:p>
+          </p:txBody>
+        </p:sp>
       </p:grpSp>
-      <p:cxnSp>
-        <p:nvCxnSpPr>
-          <p:cNvPr id="20" name="Straight Connector 19">
-            <a:extLst>
-              <a:ext uri="{FF2B5EF4-FFF2-40B4-BE49-F238E27FC236}">
-                <a16:creationId xmlns:a16="http://schemas.microsoft.com/office/drawing/2014/main" id="{ECA1DE89-BAD5-49FB-9E2D-DA692CCDDA52}"/>
-              </a:ext>
-            </a:extLst>
-          </p:cNvPr>
-          <p:cNvCxnSpPr>
-            <a:cxnSpLocks/>
-          </p:cNvCxnSpPr>
-          <p:nvPr/>
-        </p:nvCxnSpPr>
-        <p:spPr>
-          <a:xfrm>
-            <a:off x="6228275" y="1129385"/>
-            <a:ext cx="0" cy="4142582"/>
-          </a:xfrm>
-          <a:prstGeom prst="line">
-            <a:avLst/>
-          </a:prstGeom>
-          <a:ln w="28575"/>
-        </p:spPr>
-        <p:style>
-          <a:lnRef idx="1">
-            <a:schemeClr val="dk1"/>
-          </a:lnRef>
-          <a:fillRef idx="0">
-            <a:schemeClr val="dk1"/>
-          </a:fillRef>
-          <a:effectRef idx="0">
-            <a:schemeClr val="dk1"/>
-          </a:effectRef>
-          <a:fontRef idx="minor">
-            <a:schemeClr val="tx1"/>
-          </a:fontRef>
-        </p:style>
-      </p:cxnSp>
     </p:spTree>
     <p:extLst>
       <p:ext uri="{BB962C8B-B14F-4D97-AF65-F5344CB8AC3E}">
@@ -3907,10 +3980,10 @@
       </p:grpSpPr>
       <p:grpSp>
         <p:nvGrpSpPr>
-          <p:cNvPr id="13" name="Group 12">
+          <p:cNvPr id="5" name="Group 4">
             <a:extLst>
               <a:ext uri="{FF2B5EF4-FFF2-40B4-BE49-F238E27FC236}">
-                <a16:creationId xmlns:a16="http://schemas.microsoft.com/office/drawing/2014/main" id="{1CB2894F-F0DE-4A26-998F-9968D33FED2E}"/>
+                <a16:creationId xmlns:a16="http://schemas.microsoft.com/office/drawing/2014/main" id="{0FE8BA03-3B6B-40FA-B360-478D9B91AE6C}"/>
               </a:ext>
             </a:extLst>
           </p:cNvPr>
@@ -3919,10 +3992,10 @@
         </p:nvGrpSpPr>
         <p:grpSpPr>
           <a:xfrm>
-            <a:off x="436787" y="276284"/>
-            <a:ext cx="11318426" cy="4995683"/>
-            <a:chOff x="485861" y="12781"/>
-            <a:chExt cx="11318426" cy="4995683"/>
+            <a:off x="0" y="335459"/>
+            <a:ext cx="12192000" cy="5714433"/>
+            <a:chOff x="0" y="335459"/>
+            <a:chExt cx="12192000" cy="5714433"/>
           </a:xfrm>
         </p:grpSpPr>
         <p:sp>
@@ -3939,7 +4012,7 @@
           </p:nvSpPr>
           <p:spPr>
             <a:xfrm>
-              <a:off x="4269398" y="12781"/>
+              <a:off x="4220322" y="335459"/>
               <a:ext cx="3653203" cy="584775"/>
             </a:xfrm>
             <a:prstGeom prst="rect">
@@ -3960,157 +4033,12 @@
             </a:p>
           </p:txBody>
         </p:sp>
-        <p:pic>
-          <p:nvPicPr>
-            <p:cNvPr id="3" name="Picture 2" descr="Table&#10;&#10;Description automatically generated">
+        <p:sp>
+          <p:nvSpPr>
+            <p:cNvPr id="18" name="TextBox 17">
               <a:extLst>
                 <a:ext uri="{FF2B5EF4-FFF2-40B4-BE49-F238E27FC236}">
-                  <a16:creationId xmlns:a16="http://schemas.microsoft.com/office/drawing/2014/main" id="{FA4F097F-EEBB-4BD0-B5AF-47000E745B8E}"/>
-                </a:ext>
-              </a:extLst>
-            </p:cNvPr>
-            <p:cNvPicPr>
-              <a:picLocks noChangeAspect="1"/>
-            </p:cNvPicPr>
-            <p:nvPr/>
-          </p:nvPicPr>
-          <p:blipFill>
-            <a:blip r:embed="rId2">
-              <a:extLst>
-                <a:ext uri="{28A0092B-C50C-407E-A947-70E740481C1C}">
-                  <a14:useLocalDpi xmlns:a14="http://schemas.microsoft.com/office/drawing/2010/main" val="0"/>
-                </a:ext>
-              </a:extLst>
-            </a:blip>
-            <a:stretch>
-              <a:fillRect/>
-            </a:stretch>
-          </p:blipFill>
-          <p:spPr>
-            <a:xfrm>
-              <a:off x="485861" y="1455677"/>
-              <a:ext cx="5799108" cy="3552787"/>
-            </a:xfrm>
-            <a:prstGeom prst="rect">
-              <a:avLst/>
-            </a:prstGeom>
-          </p:spPr>
-        </p:pic>
-        <p:grpSp>
-          <p:nvGrpSpPr>
-            <p:cNvPr id="12" name="Group 11">
-              <a:extLst>
-                <a:ext uri="{FF2B5EF4-FFF2-40B4-BE49-F238E27FC236}">
-                  <a16:creationId xmlns:a16="http://schemas.microsoft.com/office/drawing/2014/main" id="{CC4309DF-B64C-4E06-ACAF-4354E6F05AFC}"/>
-                </a:ext>
-              </a:extLst>
-            </p:cNvPr>
-            <p:cNvGrpSpPr/>
-            <p:nvPr/>
-          </p:nvGrpSpPr>
-          <p:grpSpPr>
-            <a:xfrm>
-              <a:off x="485861" y="1512216"/>
-              <a:ext cx="11220275" cy="3439711"/>
-              <a:chOff x="267883" y="1628678"/>
-              <a:chExt cx="11220275" cy="3439711"/>
-            </a:xfrm>
-          </p:grpSpPr>
-          <p:pic>
-            <p:nvPicPr>
-              <p:cNvPr id="7" name="Picture 6" descr="Table&#10;&#10;Description automatically generated">
-                <a:extLst>
-                  <a:ext uri="{FF2B5EF4-FFF2-40B4-BE49-F238E27FC236}">
-                    <a16:creationId xmlns:a16="http://schemas.microsoft.com/office/drawing/2014/main" id="{E9F25CB1-9F8F-4836-A3E2-48381E36F7E1}"/>
-                  </a:ext>
-                </a:extLst>
-              </p:cNvPr>
-              <p:cNvPicPr>
-                <a:picLocks noChangeAspect="1"/>
-              </p:cNvPicPr>
-              <p:nvPr/>
-            </p:nvPicPr>
-            <p:blipFill>
-              <a:blip r:embed="rId3">
-                <a:extLst>
-                  <a:ext uri="{28A0092B-C50C-407E-A947-70E740481C1C}">
-                    <a14:useLocalDpi xmlns:a14="http://schemas.microsoft.com/office/drawing/2010/main" val="0"/>
-                  </a:ext>
-                </a:extLst>
-              </a:blip>
-              <a:stretch>
-                <a:fillRect/>
-              </a:stretch>
-            </p:blipFill>
-            <p:spPr>
-              <a:xfrm>
-                <a:off x="6082896" y="1628678"/>
-                <a:ext cx="5405262" cy="3439711"/>
-              </a:xfrm>
-              <a:prstGeom prst="rect">
-                <a:avLst/>
-              </a:prstGeom>
-            </p:spPr>
-          </p:pic>
-          <p:sp>
-            <p:nvSpPr>
-              <p:cNvPr id="11" name="Rectangle 10">
-                <a:extLst>
-                  <a:ext uri="{FF2B5EF4-FFF2-40B4-BE49-F238E27FC236}">
-                    <a16:creationId xmlns:a16="http://schemas.microsoft.com/office/drawing/2014/main" id="{F5C991DF-5EAF-4382-9D87-856E04A4757C}"/>
-                  </a:ext>
-                </a:extLst>
-              </p:cNvPr>
-              <p:cNvSpPr/>
-              <p:nvPr/>
-            </p:nvSpPr>
-            <p:spPr>
-              <a:xfrm>
-                <a:off x="267883" y="4359564"/>
-                <a:ext cx="11220275" cy="230909"/>
-              </a:xfrm>
-              <a:prstGeom prst="rect">
-                <a:avLst/>
-              </a:prstGeom>
-              <a:noFill/>
-              <a:ln w="28575">
-                <a:solidFill>
-                  <a:srgbClr val="FF0000"/>
-                </a:solidFill>
-              </a:ln>
-            </p:spPr>
-            <p:style>
-              <a:lnRef idx="2">
-                <a:schemeClr val="accent1">
-                  <a:shade val="50000"/>
-                </a:schemeClr>
-              </a:lnRef>
-              <a:fillRef idx="1">
-                <a:schemeClr val="accent1"/>
-              </a:fillRef>
-              <a:effectRef idx="0">
-                <a:schemeClr val="accent1"/>
-              </a:effectRef>
-              <a:fontRef idx="minor">
-                <a:schemeClr val="lt1"/>
-              </a:fontRef>
-            </p:style>
-            <p:txBody>
-              <a:bodyPr rtlCol="0" anchor="ctr"/>
-              <a:lstStyle/>
-              <a:p>
-                <a:pPr algn="ctr"/>
-                <a:endParaRPr lang="en-US"/>
-              </a:p>
-            </p:txBody>
-          </p:sp>
-        </p:grpSp>
-        <p:sp>
-          <p:nvSpPr>
-            <p:cNvPr id="15" name="TextBox 14">
-              <a:extLst>
-                <a:ext uri="{FF2B5EF4-FFF2-40B4-BE49-F238E27FC236}">
-                  <a16:creationId xmlns:a16="http://schemas.microsoft.com/office/drawing/2014/main" id="{0E85FE88-6D87-4564-BAC6-EAE0D495FFC3}"/>
+                  <a16:creationId xmlns:a16="http://schemas.microsoft.com/office/drawing/2014/main" id="{270D983B-E8E6-4956-AD78-EDC8400A59AD}"/>
                 </a:ext>
               </a:extLst>
             </p:cNvPr>
@@ -4119,59 +4047,7 @@
           </p:nvSpPr>
           <p:spPr>
             <a:xfrm>
-              <a:off x="584632" y="809346"/>
-              <a:ext cx="5601565" cy="523220"/>
-            </a:xfrm>
-            <a:prstGeom prst="rect">
-              <a:avLst/>
-            </a:prstGeom>
-            <a:noFill/>
-          </p:spPr>
-          <p:txBody>
-            <a:bodyPr wrap="square" rtlCol="0">
-              <a:spAutoFit/>
-            </a:bodyPr>
-            <a:lstStyle/>
-            <a:p>
-              <a:pPr algn="ctr"/>
-              <a:r>
-                <a:rPr lang="en-US" sz="1400" dirty="0"/>
-                <a:t>Repeated analysis (9</a:t>
-              </a:r>
-              <a:r>
-                <a:rPr lang="en-US" sz="1400" baseline="30000" dirty="0"/>
-                <a:t>th</a:t>
-              </a:r>
-              <a:r>
-                <a:rPr lang="en-US" sz="1400" dirty="0"/>
-                <a:t> grade Thomas High scores assigned </a:t>
-              </a:r>
-              <a:r>
-                <a:rPr lang="en-US" sz="1400" dirty="0" err="1"/>
-                <a:t>NaN</a:t>
-              </a:r>
-              <a:r>
-                <a:rPr lang="en-US" sz="1400" dirty="0"/>
-                <a:t> and score averages calculated with entire student count)</a:t>
-              </a:r>
-            </a:p>
-          </p:txBody>
-        </p:sp>
-        <p:sp>
-          <p:nvSpPr>
-            <p:cNvPr id="17" name="TextBox 16">
-              <a:extLst>
-                <a:ext uri="{FF2B5EF4-FFF2-40B4-BE49-F238E27FC236}">
-                  <a16:creationId xmlns:a16="http://schemas.microsoft.com/office/drawing/2014/main" id="{F34BFD53-0B0D-49B5-A493-545F80C4DA56}"/>
-                </a:ext>
-              </a:extLst>
-            </p:cNvPr>
-            <p:cNvSpPr txBox="1"/>
-            <p:nvPr/>
-          </p:nvSpPr>
-          <p:spPr>
-            <a:xfrm>
-              <a:off x="6202722" y="809345"/>
+              <a:off x="6337781" y="1118204"/>
               <a:ext cx="5601565" cy="523220"/>
             </a:xfrm>
             <a:prstGeom prst="rect">
@@ -4225,50 +4101,346 @@
             </a:p>
           </p:txBody>
         </p:sp>
+        <p:pic>
+          <p:nvPicPr>
+            <p:cNvPr id="12" name="Picture 11" descr="Table&#10;&#10;Description automatically generated">
+              <a:extLst>
+                <a:ext uri="{FF2B5EF4-FFF2-40B4-BE49-F238E27FC236}">
+                  <a16:creationId xmlns:a16="http://schemas.microsoft.com/office/drawing/2014/main" id="{9ABB149B-7B45-4221-A0E9-1C7258F905CE}"/>
+                </a:ext>
+              </a:extLst>
+            </p:cNvPr>
+            <p:cNvPicPr>
+              <a:picLocks noChangeAspect="1"/>
+            </p:cNvPicPr>
+            <p:nvPr/>
+          </p:nvPicPr>
+          <p:blipFill rotWithShape="1">
+            <a:blip r:embed="rId2">
+              <a:extLst>
+                <a:ext uri="{28A0092B-C50C-407E-A947-70E740481C1C}">
+                  <a14:useLocalDpi xmlns:a14="http://schemas.microsoft.com/office/drawing/2010/main" val="0"/>
+                </a:ext>
+              </a:extLst>
+            </a:blip>
+            <a:srcRect r="1699"/>
+            <a:stretch/>
+          </p:blipFill>
+          <p:spPr>
+            <a:xfrm>
+              <a:off x="6085129" y="2082642"/>
+              <a:ext cx="6106871" cy="3967250"/>
+            </a:xfrm>
+            <a:prstGeom prst="rect">
+              <a:avLst/>
+            </a:prstGeom>
+          </p:spPr>
+        </p:pic>
+        <p:sp>
+          <p:nvSpPr>
+            <p:cNvPr id="23" name="TextBox 22">
+              <a:extLst>
+                <a:ext uri="{FF2B5EF4-FFF2-40B4-BE49-F238E27FC236}">
+                  <a16:creationId xmlns:a16="http://schemas.microsoft.com/office/drawing/2014/main" id="{1E7E4FA1-B67A-4875-8241-878B0F3C5883}"/>
+                </a:ext>
+              </a:extLst>
+            </p:cNvPr>
+            <p:cNvSpPr txBox="1"/>
+            <p:nvPr/>
+          </p:nvSpPr>
+          <p:spPr>
+            <a:xfrm>
+              <a:off x="7745986" y="1821032"/>
+              <a:ext cx="2785153" cy="261610"/>
+            </a:xfrm>
+            <a:prstGeom prst="rect">
+              <a:avLst/>
+            </a:prstGeom>
+            <a:noFill/>
+          </p:spPr>
+          <p:txBody>
+            <a:bodyPr wrap="square" rtlCol="0">
+              <a:spAutoFit/>
+            </a:bodyPr>
+            <a:lstStyle/>
+            <a:p>
+              <a:r>
+                <a:rPr lang="en-US" sz="1100" dirty="0"/>
+                <a:t>Schools ranked by overall passing percentage</a:t>
+              </a:r>
+            </a:p>
+          </p:txBody>
+        </p:sp>
+        <p:sp>
+          <p:nvSpPr>
+            <p:cNvPr id="24" name="TextBox 23">
+              <a:extLst>
+                <a:ext uri="{FF2B5EF4-FFF2-40B4-BE49-F238E27FC236}">
+                  <a16:creationId xmlns:a16="http://schemas.microsoft.com/office/drawing/2014/main" id="{D480DD0A-2DAB-4B01-9BBE-90AA6972BE4E}"/>
+                </a:ext>
+              </a:extLst>
+            </p:cNvPr>
+            <p:cNvSpPr txBox="1"/>
+            <p:nvPr/>
+          </p:nvSpPr>
+          <p:spPr>
+            <a:xfrm>
+              <a:off x="1629045" y="1821032"/>
+              <a:ext cx="2785153" cy="261610"/>
+            </a:xfrm>
+            <a:prstGeom prst="rect">
+              <a:avLst/>
+            </a:prstGeom>
+            <a:noFill/>
+          </p:spPr>
+          <p:txBody>
+            <a:bodyPr wrap="square" rtlCol="0">
+              <a:spAutoFit/>
+            </a:bodyPr>
+            <a:lstStyle/>
+            <a:p>
+              <a:r>
+                <a:rPr lang="en-US" sz="1100" dirty="0"/>
+                <a:t>Schools ranked by overall passing percentage</a:t>
+              </a:r>
+            </a:p>
+          </p:txBody>
+        </p:sp>
+        <p:sp>
+          <p:nvSpPr>
+            <p:cNvPr id="11" name="TextBox 10">
+              <a:extLst>
+                <a:ext uri="{FF2B5EF4-FFF2-40B4-BE49-F238E27FC236}">
+                  <a16:creationId xmlns:a16="http://schemas.microsoft.com/office/drawing/2014/main" id="{32E44A93-D34C-4CF2-8B7D-21839E38BC99}"/>
+                </a:ext>
+              </a:extLst>
+            </p:cNvPr>
+            <p:cNvSpPr txBox="1"/>
+            <p:nvPr/>
+          </p:nvSpPr>
+          <p:spPr>
+            <a:xfrm>
+              <a:off x="220838" y="1118204"/>
+              <a:ext cx="5601565" cy="523220"/>
+            </a:xfrm>
+            <a:prstGeom prst="rect">
+              <a:avLst/>
+            </a:prstGeom>
+            <a:noFill/>
+          </p:spPr>
+          <p:txBody>
+            <a:bodyPr wrap="square" rtlCol="0">
+              <a:spAutoFit/>
+            </a:bodyPr>
+            <a:lstStyle/>
+            <a:p>
+              <a:pPr algn="ctr"/>
+              <a:r>
+                <a:rPr lang="en-US" sz="1400" dirty="0"/>
+                <a:t>Repeated analysis (9</a:t>
+              </a:r>
+              <a:r>
+                <a:rPr lang="en-US" sz="1400" baseline="30000" dirty="0"/>
+                <a:t>th</a:t>
+              </a:r>
+              <a:r>
+                <a:rPr lang="en-US" sz="1400" dirty="0"/>
+                <a:t> grade Thomas High scores assigned </a:t>
+              </a:r>
+              <a:r>
+                <a:rPr lang="en-US" sz="1400" dirty="0" err="1"/>
+                <a:t>NaN</a:t>
+              </a:r>
+              <a:r>
+                <a:rPr lang="en-US" sz="1400" dirty="0"/>
+                <a:t> and score averages calculated with entire student count)</a:t>
+              </a:r>
+            </a:p>
+          </p:txBody>
+        </p:sp>
+        <p:sp>
+          <p:nvSpPr>
+            <p:cNvPr id="13" name="Rectangle 12">
+              <a:extLst>
+                <a:ext uri="{FF2B5EF4-FFF2-40B4-BE49-F238E27FC236}">
+                  <a16:creationId xmlns:a16="http://schemas.microsoft.com/office/drawing/2014/main" id="{F3925993-BC39-4674-99FF-E3963E99A784}"/>
+                </a:ext>
+              </a:extLst>
+            </p:cNvPr>
+            <p:cNvSpPr/>
+            <p:nvPr/>
+          </p:nvSpPr>
+          <p:spPr>
+            <a:xfrm>
+              <a:off x="6074395" y="2605875"/>
+              <a:ext cx="6117605" cy="261610"/>
+            </a:xfrm>
+            <a:prstGeom prst="rect">
+              <a:avLst/>
+            </a:prstGeom>
+            <a:noFill/>
+            <a:ln w="28575">
+              <a:solidFill>
+                <a:srgbClr val="FF0000"/>
+              </a:solidFill>
+            </a:ln>
+          </p:spPr>
+          <p:style>
+            <a:lnRef idx="2">
+              <a:schemeClr val="accent1">
+                <a:shade val="50000"/>
+              </a:schemeClr>
+            </a:lnRef>
+            <a:fillRef idx="1">
+              <a:schemeClr val="accent1"/>
+            </a:fillRef>
+            <a:effectRef idx="0">
+              <a:schemeClr val="accent1"/>
+            </a:effectRef>
+            <a:fontRef idx="minor">
+              <a:schemeClr val="lt1"/>
+            </a:fontRef>
+          </p:style>
+          <p:txBody>
+            <a:bodyPr rtlCol="0" anchor="ctr"/>
+            <a:lstStyle/>
+            <a:p>
+              <a:pPr algn="ctr"/>
+              <a:endParaRPr lang="en-US"/>
+            </a:p>
+          </p:txBody>
+        </p:sp>
+        <p:pic>
+          <p:nvPicPr>
+            <p:cNvPr id="4" name="Picture 3" descr="Table&#10;&#10;Description automatically generated">
+              <a:extLst>
+                <a:ext uri="{FF2B5EF4-FFF2-40B4-BE49-F238E27FC236}">
+                  <a16:creationId xmlns:a16="http://schemas.microsoft.com/office/drawing/2014/main" id="{85D18CB4-F919-4F3A-A4BE-569F022C7300}"/>
+                </a:ext>
+              </a:extLst>
+            </p:cNvPr>
+            <p:cNvPicPr>
+              <a:picLocks noChangeAspect="1"/>
+            </p:cNvPicPr>
+            <p:nvPr/>
+          </p:nvPicPr>
+          <p:blipFill rotWithShape="1">
+            <a:blip r:embed="rId3">
+              <a:extLst>
+                <a:ext uri="{28A0092B-C50C-407E-A947-70E740481C1C}">
+                  <a14:useLocalDpi xmlns:a14="http://schemas.microsoft.com/office/drawing/2010/main" val="0"/>
+                </a:ext>
+              </a:extLst>
+            </a:blip>
+            <a:srcRect l="1194" r="1151"/>
+            <a:stretch/>
+          </p:blipFill>
+          <p:spPr>
+            <a:xfrm>
+              <a:off x="0" y="2103516"/>
+              <a:ext cx="6011474" cy="3946376"/>
+            </a:xfrm>
+            <a:prstGeom prst="rect">
+              <a:avLst/>
+            </a:prstGeom>
+          </p:spPr>
+        </p:pic>
+        <p:sp>
+          <p:nvSpPr>
+            <p:cNvPr id="19" name="Rectangle 18">
+              <a:extLst>
+                <a:ext uri="{FF2B5EF4-FFF2-40B4-BE49-F238E27FC236}">
+                  <a16:creationId xmlns:a16="http://schemas.microsoft.com/office/drawing/2014/main" id="{FAC35377-6AA7-4E0D-A628-7EDD606AB827}"/>
+                </a:ext>
+              </a:extLst>
+            </p:cNvPr>
+            <p:cNvSpPr/>
+            <p:nvPr/>
+          </p:nvSpPr>
+          <p:spPr>
+            <a:xfrm>
+              <a:off x="21607" y="4029893"/>
+              <a:ext cx="6036888" cy="249143"/>
+            </a:xfrm>
+            <a:prstGeom prst="rect">
+              <a:avLst/>
+            </a:prstGeom>
+            <a:noFill/>
+            <a:ln w="28575">
+              <a:solidFill>
+                <a:srgbClr val="FF0000"/>
+              </a:solidFill>
+            </a:ln>
+          </p:spPr>
+          <p:style>
+            <a:lnRef idx="2">
+              <a:schemeClr val="accent1">
+                <a:shade val="50000"/>
+              </a:schemeClr>
+            </a:lnRef>
+            <a:fillRef idx="1">
+              <a:schemeClr val="accent1"/>
+            </a:fillRef>
+            <a:effectRef idx="0">
+              <a:schemeClr val="accent1"/>
+            </a:effectRef>
+            <a:fontRef idx="minor">
+              <a:schemeClr val="lt1"/>
+            </a:fontRef>
+          </p:style>
+          <p:txBody>
+            <a:bodyPr rtlCol="0" anchor="ctr"/>
+            <a:lstStyle/>
+            <a:p>
+              <a:pPr algn="ctr"/>
+              <a:endParaRPr lang="en-US"/>
+            </a:p>
+          </p:txBody>
+        </p:sp>
+        <p:cxnSp>
+          <p:nvCxnSpPr>
+            <p:cNvPr id="20" name="Straight Connector 19">
+              <a:extLst>
+                <a:ext uri="{FF2B5EF4-FFF2-40B4-BE49-F238E27FC236}">
+                  <a16:creationId xmlns:a16="http://schemas.microsoft.com/office/drawing/2014/main" id="{ECA1DE89-BAD5-49FB-9E2D-DA692CCDDA52}"/>
+                </a:ext>
+              </a:extLst>
+            </p:cNvPr>
+            <p:cNvCxnSpPr>
+              <a:cxnSpLocks/>
+            </p:cNvCxnSpPr>
+            <p:nvPr/>
+          </p:nvCxnSpPr>
+          <p:spPr>
+            <a:xfrm flipH="1">
+              <a:off x="6058495" y="1118374"/>
+              <a:ext cx="15900" cy="4838543"/>
+            </a:xfrm>
+            <a:prstGeom prst="line">
+              <a:avLst/>
+            </a:prstGeom>
+            <a:ln w="28575"/>
+          </p:spPr>
+          <p:style>
+            <a:lnRef idx="1">
+              <a:schemeClr val="dk1"/>
+            </a:lnRef>
+            <a:fillRef idx="0">
+              <a:schemeClr val="dk1"/>
+            </a:fillRef>
+            <a:effectRef idx="0">
+              <a:schemeClr val="dk1"/>
+            </a:effectRef>
+            <a:fontRef idx="minor">
+              <a:schemeClr val="tx1"/>
+            </a:fontRef>
+          </p:style>
+        </p:cxnSp>
       </p:grpSp>
-      <p:cxnSp>
-        <p:nvCxnSpPr>
-          <p:cNvPr id="18" name="Straight Connector 17">
-            <a:extLst>
-              <a:ext uri="{FF2B5EF4-FFF2-40B4-BE49-F238E27FC236}">
-                <a16:creationId xmlns:a16="http://schemas.microsoft.com/office/drawing/2014/main" id="{3B3B9685-A411-495D-BA06-A980856D7BA4}"/>
-              </a:ext>
-            </a:extLst>
-          </p:cNvPr>
-          <p:cNvCxnSpPr>
-            <a:cxnSpLocks/>
-          </p:cNvCxnSpPr>
-          <p:nvPr/>
-        </p:nvCxnSpPr>
-        <p:spPr>
-          <a:xfrm>
-            <a:off x="6228275" y="1129385"/>
-            <a:ext cx="0" cy="4142582"/>
-          </a:xfrm>
-          <a:prstGeom prst="line">
-            <a:avLst/>
-          </a:prstGeom>
-          <a:ln w="28575"/>
-        </p:spPr>
-        <p:style>
-          <a:lnRef idx="1">
-            <a:schemeClr val="dk1"/>
-          </a:lnRef>
-          <a:fillRef idx="0">
-            <a:schemeClr val="dk1"/>
-          </a:fillRef>
-          <a:effectRef idx="0">
-            <a:schemeClr val="dk1"/>
-          </a:effectRef>
-          <a:fontRef idx="minor">
-            <a:schemeClr val="tx1"/>
-          </a:fontRef>
-        </p:style>
-      </p:cxnSp>
     </p:spTree>
     <p:extLst>
       <p:ext uri="{BB962C8B-B14F-4D97-AF65-F5344CB8AC3E}">
-        <p14:creationId xmlns:p14="http://schemas.microsoft.com/office/powerpoint/2010/main" val="4099837051"/>
+        <p14:creationId xmlns:p14="http://schemas.microsoft.com/office/powerpoint/2010/main" val="826162723"/>
       </p:ext>
     </p:extLst>
   </p:cSld>

</xml_diff>